<commit_message>
Visio of project timeline
</commit_message>
<xml_diff>
--- a/Requirements/Presentations/GreenSheets Recommendations.pptx
+++ b/Requirements/Presentations/GreenSheets Recommendations.pptx
@@ -346,7 +346,7 @@
               <a:pPr>
                 <a:defRPr/>
               </a:pPr>
-              <a:t>6/7/16</a:t>
+              <a:t>6/8/16</a:t>
             </a:fld>
             <a:endParaRPr lang="en-US" dirty="0"/>
           </a:p>
@@ -1710,7 +1710,7 @@
               <a:pPr>
                 <a:defRPr/>
               </a:pPr>
-              <a:t>June 7, 2016</a:t>
+              <a:t>June 8, 2016</a:t>
             </a:fld>
             <a:endParaRPr lang="en-US" dirty="0"/>
           </a:p>
@@ -4292,7 +4292,7 @@
           <a:p>
             <a:fld id="{9E23832F-A033-A54E-AB4C-FBC3D83AD4AA}" type="datetimeFigureOut">
               <a:rPr lang="en-US" smtClean="0"/>
-              <a:t>6/7/16</a:t>
+              <a:t>6/8/16</a:t>
             </a:fld>
             <a:endParaRPr lang="en-US"/>
           </a:p>
@@ -4462,7 +4462,7 @@
           <a:p>
             <a:fld id="{9E23832F-A033-A54E-AB4C-FBC3D83AD4AA}" type="datetimeFigureOut">
               <a:rPr lang="en-US" smtClean="0"/>
-              <a:t>6/7/16</a:t>
+              <a:t>6/8/16</a:t>
             </a:fld>
             <a:endParaRPr lang="en-US"/>
           </a:p>
@@ -8592,7 +8592,7 @@
             </a:pPr>
             <a:fld id="{63A80243-55C2-1C49-BA61-21AC8F55AA45}" type="datetime4">
               <a:rPr lang="en-US" smtClean="0"/>
-              <a:t>June 7, 2016</a:t>
+              <a:t>June 8, 2016</a:t>
             </a:fld>
             <a:endParaRPr lang="en-US" dirty="0"/>
           </a:p>
@@ -9401,7 +9401,7 @@
         </p:nvSpPr>
         <p:spPr>
           <a:xfrm>
-            <a:off x="481521" y="685800"/>
+            <a:off x="481521" y="762000"/>
             <a:ext cx="8165592" cy="5867400"/>
           </a:xfrm>
         </p:spPr>
@@ -9415,7 +9415,11 @@
             </a:r>
           </a:p>
           <a:p>
-            <a:pPr lvl="2"/>
+            <a:pPr lvl="1">
+              <a:spcAft>
+                <a:spcPts val="600"/>
+              </a:spcAft>
+            </a:pPr>
             <a:r>
               <a:rPr lang="en-US" sz="1600" dirty="0" err="1"/>
               <a:t>Greensheets</a:t>
@@ -9434,7 +9438,11 @@
             </a:r>
           </a:p>
           <a:p>
-            <a:pPr lvl="2"/>
+            <a:pPr lvl="1">
+              <a:spcAft>
+                <a:spcPts val="600"/>
+              </a:spcAft>
+            </a:pPr>
             <a:r>
               <a:rPr lang="en-US" sz="1600" dirty="0" err="1"/>
               <a:t>Greensheets</a:t>
@@ -9445,7 +9453,11 @@
             </a:r>
           </a:p>
           <a:p>
-            <a:pPr lvl="2"/>
+            <a:pPr lvl="1">
+              <a:spcAft>
+                <a:spcPts val="600"/>
+              </a:spcAft>
+            </a:pPr>
             <a:r>
               <a:rPr lang="en-US" sz="1600" dirty="0"/>
               <a:t>Duplicate </a:t>
@@ -9466,7 +9478,11 @@
           <a:p>
             <a:r>
               <a:rPr lang="en-US" sz="1600" b="1" dirty="0" smtClean="0"/>
-              <a:t>Accommodate additional business needs</a:t>
+              <a:t>Accommodate </a:t>
+            </a:r>
+            <a:r>
+              <a:rPr lang="en-US" sz="1600" b="1" dirty="0" smtClean="0"/>
+              <a:t>business needs</a:t>
             </a:r>
             <a:r>
               <a:rPr lang="en-US" sz="1600" dirty="0" smtClean="0"/>
@@ -9474,200 +9490,160 @@
             </a:r>
           </a:p>
           <a:p>
-            <a:pPr marL="0" lvl="3" indent="0" fontAlgn="auto">
-              <a:spcBef>
-                <a:spcPts val="0"/>
-              </a:spcBef>
+            <a:pPr lvl="1"/>
+            <a:r>
+              <a:rPr lang="en-US" sz="1600" dirty="0" smtClean="0"/>
+              <a:t>Tech stack upgrade</a:t>
+            </a:r>
+          </a:p>
+          <a:p>
+            <a:pPr lvl="1"/>
+            <a:r>
+              <a:rPr lang="en-US" sz="1600" dirty="0"/>
+              <a:t>UI modernization and usability</a:t>
+            </a:r>
+            <a:endParaRPr lang="en-US" sz="1600" dirty="0" smtClean="0"/>
+          </a:p>
+          <a:p>
+            <a:pPr lvl="1"/>
+            <a:r>
+              <a:rPr lang="en-US" sz="1600" dirty="0" smtClean="0"/>
+              <a:t>Provide </a:t>
+            </a:r>
+            <a:r>
+              <a:rPr lang="en-US" sz="1600" dirty="0"/>
+              <a:t>reporting capabilities</a:t>
+            </a:r>
+          </a:p>
+          <a:p>
+            <a:pPr lvl="3">
               <a:spcAft>
-                <a:spcPts val="0"/>
+                <a:spcPts val="600"/>
               </a:spcAft>
-              <a:buClrTx/>
-              <a:buNone/>
               <a:defRPr/>
             </a:pPr>
             <a:r>
-              <a:rPr lang="en-US" sz="1600" u="sng" dirty="0"/>
-              <a:t>Previously agreed upon:</a:t>
-            </a:r>
-          </a:p>
-          <a:p>
-            <a:pPr marL="400050" lvl="4" indent="-171450" fontAlgn="auto">
-              <a:spcBef>
-                <a:spcPts val="0"/>
-              </a:spcBef>
-              <a:spcAft>
-                <a:spcPts val="0"/>
-              </a:spcAft>
-              <a:buClrTx/>
+              <a:rPr lang="en-US" sz="1400" dirty="0"/>
+              <a:t>Ad-hoc reports on statistics related to answers to a specific question</a:t>
+            </a:r>
+          </a:p>
+          <a:p>
+            <a:pPr lvl="3">
               <a:defRPr/>
             </a:pPr>
             <a:r>
-              <a:rPr lang="en-US" dirty="0"/>
-              <a:t>Provide reporting capabilities</a:t>
-            </a:r>
-          </a:p>
-          <a:p>
-            <a:pPr lvl="2">
+              <a:rPr lang="en-US" sz="1400" dirty="0"/>
+              <a:t>User-friendly dashboard report to easily access the grants and the underlying </a:t>
+            </a:r>
+            <a:r>
+              <a:rPr lang="en-US" sz="1400" dirty="0" err="1"/>
+              <a:t>greensheets</a:t>
+            </a:r>
+            <a:r>
+              <a:rPr lang="en-US" sz="1400" dirty="0"/>
+              <a:t> and also to help visualize some of the key metrics. </a:t>
+            </a:r>
+            <a:endParaRPr lang="en-US" sz="1400" dirty="0" smtClean="0"/>
+          </a:p>
+          <a:p>
+            <a:pPr lvl="1">
+              <a:spcAft>
+                <a:spcPts val="600"/>
+              </a:spcAft>
               <a:defRPr/>
             </a:pPr>
             <a:r>
-              <a:rPr lang="en-US" sz="1600" dirty="0"/>
-              <a:t>Ad-hoc reports on statistics related to answers to a specific question</a:t>
-            </a:r>
-          </a:p>
-          <a:p>
-            <a:pPr lvl="2">
+              <a:rPr lang="en-US" sz="1600" dirty="0" smtClean="0"/>
+              <a:t>Enhance search capabilities</a:t>
+            </a:r>
+          </a:p>
+          <a:p>
+            <a:pPr lvl="1">
+              <a:spcAft>
+                <a:spcPts val="600"/>
+              </a:spcAft>
               <a:defRPr/>
             </a:pPr>
             <a:r>
-              <a:rPr lang="en-US" sz="1600" dirty="0"/>
-              <a:t>User-friendly dashboard report to easily access the grants and the underlying </a:t>
-            </a:r>
-            <a:r>
-              <a:rPr lang="en-US" sz="1600" dirty="0" err="1"/>
-              <a:t>greensheets</a:t>
-            </a:r>
-            <a:r>
-              <a:rPr lang="en-US" sz="1600" dirty="0"/>
-              <a:t> and also to help visualize some of the key metrics. This is house-keeping” reports, for example ‘how many </a:t>
-            </a:r>
-            <a:r>
-              <a:rPr lang="en-US" sz="1600" dirty="0" err="1"/>
-              <a:t>greensheets</a:t>
-            </a:r>
-            <a:r>
-              <a:rPr lang="en-US" sz="1600" dirty="0"/>
-              <a:t> in Submitted status</a:t>
-            </a:r>
-          </a:p>
-          <a:p>
-            <a:pPr marL="400050" lvl="4" indent="-171450" fontAlgn="auto">
-              <a:spcBef>
-                <a:spcPts val="0"/>
-              </a:spcBef>
+              <a:rPr lang="en-US" sz="1600" dirty="0" smtClean="0"/>
+              <a:t>Enhance security</a:t>
+            </a:r>
+          </a:p>
+          <a:p>
+            <a:pPr lvl="1">
               <a:spcAft>
-                <a:spcPts val="0"/>
+                <a:spcPts val="600"/>
               </a:spcAft>
-              <a:buClrTx/>
               <a:defRPr/>
             </a:pPr>
             <a:r>
-              <a:rPr lang="en-US" dirty="0"/>
-              <a:t>Enhance search capabilities</a:t>
-            </a:r>
-          </a:p>
-          <a:p>
-            <a:pPr marL="400050" lvl="4" indent="-171450" fontAlgn="auto">
-              <a:spcBef>
-                <a:spcPts val="0"/>
-              </a:spcBef>
+              <a:rPr lang="en-US" sz="1600" dirty="0" smtClean="0"/>
+              <a:t>UI </a:t>
+            </a:r>
+            <a:r>
+              <a:rPr lang="en-US" sz="1600" dirty="0"/>
+              <a:t>modernization and </a:t>
+            </a:r>
+            <a:r>
+              <a:rPr lang="en-US" sz="1600" dirty="0" smtClean="0"/>
+              <a:t>usability</a:t>
+            </a:r>
+            <a:endParaRPr lang="en-US" sz="1600" dirty="0"/>
+          </a:p>
+          <a:p>
+            <a:pPr lvl="1">
               <a:spcAft>
-                <a:spcPts val="0"/>
+                <a:spcPts val="600"/>
               </a:spcAft>
-              <a:buClrTx/>
               <a:defRPr/>
             </a:pPr>
             <a:r>
-              <a:rPr lang="en-US" dirty="0"/>
-              <a:t>Enhance security</a:t>
-            </a:r>
-          </a:p>
-          <a:p>
-            <a:pPr marL="400050" lvl="4" indent="-171450" fontAlgn="auto">
-              <a:spcBef>
-                <a:spcPts val="0"/>
-              </a:spcBef>
+              <a:rPr lang="en-US" sz="1600" dirty="0" smtClean="0"/>
+              <a:t>Using </a:t>
+            </a:r>
+            <a:r>
+              <a:rPr lang="en-US" sz="1600" dirty="0"/>
+              <a:t>additional capabilities of Form </a:t>
+            </a:r>
+            <a:r>
+              <a:rPr lang="en-US" sz="1600" dirty="0" smtClean="0"/>
+              <a:t>Builder</a:t>
+            </a:r>
+          </a:p>
+          <a:p>
+            <a:pPr lvl="1">
               <a:spcAft>
-                <a:spcPts val="0"/>
+                <a:spcPts val="600"/>
               </a:spcAft>
-              <a:buClrTx/>
               <a:defRPr/>
             </a:pPr>
             <a:r>
-              <a:rPr lang="en-US" dirty="0"/>
-              <a:t>UI modernization and usability</a:t>
-            </a:r>
-          </a:p>
-          <a:p>
-            <a:pPr marL="400050" lvl="4" indent="-171450" fontAlgn="auto">
-              <a:spcBef>
-                <a:spcPts val="0"/>
-              </a:spcBef>
+              <a:rPr lang="en-US" sz="1600" dirty="0" smtClean="0"/>
+              <a:t>Changes </a:t>
+            </a:r>
+            <a:r>
+              <a:rPr lang="en-US" sz="1600" dirty="0"/>
+              <a:t>to business flow and </a:t>
+            </a:r>
+            <a:r>
+              <a:rPr lang="en-US" sz="1600" dirty="0" smtClean="0"/>
+              <a:t>navigation</a:t>
+            </a:r>
+          </a:p>
+          <a:p>
+            <a:pPr lvl="1">
               <a:spcAft>
-                <a:spcPts val="0"/>
+                <a:spcPts val="600"/>
               </a:spcAft>
-              <a:buClrTx/>
               <a:defRPr/>
             </a:pPr>
-            <a:endParaRPr lang="en-US" dirty="0"/>
-          </a:p>
-          <a:p>
-            <a:pPr marL="228600" lvl="4" indent="0" fontAlgn="auto">
-              <a:spcBef>
-                <a:spcPts val="0"/>
-              </a:spcBef>
-              <a:spcAft>
-                <a:spcPts val="0"/>
-              </a:spcAft>
-              <a:buClrTx/>
-              <a:buNone/>
-              <a:defRPr/>
-            </a:pPr>
-            <a:r>
-              <a:rPr lang="en-US" u="sng" dirty="0" smtClean="0"/>
-              <a:t>New </a:t>
-            </a:r>
-            <a:r>
-              <a:rPr lang="en-US" u="sng" dirty="0"/>
-              <a:t>(questions):</a:t>
-            </a:r>
-          </a:p>
-          <a:p>
-            <a:pPr marL="400050" lvl="4" indent="-171450" fontAlgn="auto">
-              <a:spcBef>
-                <a:spcPts val="0"/>
-              </a:spcBef>
-              <a:spcAft>
-                <a:spcPts val="0"/>
-              </a:spcAft>
-              <a:buClrTx/>
-              <a:defRPr/>
-            </a:pPr>
-            <a:r>
-              <a:rPr lang="en-US" dirty="0"/>
-              <a:t>Using additional capabilities of Form Builder</a:t>
-            </a:r>
-          </a:p>
-          <a:p>
-            <a:pPr marL="400050" lvl="4" indent="-171450" fontAlgn="auto">
-              <a:spcBef>
-                <a:spcPts val="0"/>
-              </a:spcBef>
-              <a:spcAft>
-                <a:spcPts val="0"/>
-              </a:spcAft>
-              <a:buClrTx/>
-              <a:defRPr/>
-            </a:pPr>
-            <a:r>
-              <a:rPr lang="en-US" dirty="0"/>
-              <a:t>Changes to business flow and navigation</a:t>
-            </a:r>
-          </a:p>
-          <a:p>
-            <a:pPr marL="400050" lvl="4" indent="-171450" fontAlgn="auto">
-              <a:spcBef>
-                <a:spcPts val="0"/>
-              </a:spcBef>
-              <a:spcAft>
-                <a:spcPts val="0"/>
-              </a:spcAft>
-              <a:buClrTx/>
-              <a:defRPr/>
-            </a:pPr>
-            <a:r>
-              <a:rPr lang="en-US" dirty="0"/>
-              <a:t>Compliance document retention policy</a:t>
+            <a:r>
+              <a:rPr lang="en-US" sz="1600" dirty="0" smtClean="0"/>
+              <a:t>Compliance </a:t>
+            </a:r>
+            <a:r>
+              <a:rPr lang="en-US" sz="1600" dirty="0"/>
+              <a:t>document retention policy</a:t>
             </a:r>
           </a:p>
           <a:p>
@@ -9812,10 +9788,6 @@
               </a:rPr>
               <a:t>Notes</a:t>
             </a:r>
-            <a:endParaRPr lang="en-US" dirty="0" smtClean="0">
-              <a:latin typeface="Arial" panose="020B0604020202020204" pitchFamily="34" charset="0"/>
-              <a:cs typeface="Arial" panose="020B0604020202020204" pitchFamily="34" charset="0"/>
-            </a:endParaRPr>
           </a:p>
           <a:p>
             <a:r>
@@ -9986,21 +9958,21 @@
                 <a:gridCol w="394335">
                   <a:extLst>
                     <a:ext uri="{9D8B030D-6E8A-4147-A177-3AD203B41FA5}">
-                      <a16:colId xmlns:a16="http://schemas.microsoft.com/office/drawing/2014/main" xmlns="" val="380828174"/>
+                      <a16:colId xmlns="" xmlns:a16="http://schemas.microsoft.com/office/drawing/2014/main" val="380828174"/>
                     </a:ext>
                   </a:extLst>
                 </a:gridCol>
                 <a:gridCol w="1586865">
                   <a:extLst>
                     <a:ext uri="{9D8B030D-6E8A-4147-A177-3AD203B41FA5}">
-                      <a16:colId xmlns:a16="http://schemas.microsoft.com/office/drawing/2014/main" xmlns="" val="1351816480"/>
+                      <a16:colId xmlns="" xmlns:a16="http://schemas.microsoft.com/office/drawing/2014/main" val="1351816480"/>
                     </a:ext>
                   </a:extLst>
                 </a:gridCol>
                 <a:gridCol w="6220968">
                   <a:extLst>
                     <a:ext uri="{9D8B030D-6E8A-4147-A177-3AD203B41FA5}">
-                      <a16:colId xmlns:a16="http://schemas.microsoft.com/office/drawing/2014/main" xmlns="" val="287736014"/>
+                      <a16:colId xmlns="" xmlns:a16="http://schemas.microsoft.com/office/drawing/2014/main" val="287736014"/>
                     </a:ext>
                   </a:extLst>
                 </a:gridCol>
@@ -10050,7 +10022,7 @@
                 </a:tc>
                 <a:extLst>
                   <a:ext uri="{0D108BD9-81ED-4DB2-BD59-A6C34878D82A}">
-                    <a16:rowId xmlns:a16="http://schemas.microsoft.com/office/drawing/2014/main" xmlns="" val="1140275068"/>
+                    <a16:rowId xmlns="" xmlns:a16="http://schemas.microsoft.com/office/drawing/2014/main" val="1140275068"/>
                   </a:ext>
                 </a:extLst>
               </a:tr>
@@ -10153,27 +10125,8 @@
                           <a:ea typeface="+mn-ea"/>
                           <a:cs typeface="+mn-cs"/>
                         </a:rPr>
-                        <a:t>will </a:t>
+                        <a:t>will allow run ad-hoc reports on statistics related to answers to a specific question on demand. </a:t>
                       </a:r>
-                      <a:r>
-                        <a:rPr lang="en-US" sz="1000" kern="1200" dirty="0" smtClean="0">
-                          <a:solidFill>
-                            <a:schemeClr val="dk1"/>
-                          </a:solidFill>
-                          <a:latin typeface="+mn-lt"/>
-                          <a:ea typeface="+mn-ea"/>
-                          <a:cs typeface="+mn-cs"/>
-                        </a:rPr>
-                        <a:t>allow run ad-hoc reports on statistics related to answers to a specific question on demand. </a:t>
-                      </a:r>
-                      <a:endParaRPr lang="en-US" sz="1000" kern="1200" dirty="0" smtClean="0">
-                        <a:solidFill>
-                          <a:schemeClr val="dk1"/>
-                        </a:solidFill>
-                        <a:latin typeface="+mn-lt"/>
-                        <a:ea typeface="+mn-ea"/>
-                        <a:cs typeface="+mn-cs"/>
-                      </a:endParaRPr>
                     </a:p>
                     <a:p>
                       <a:pPr marL="628650" lvl="1" indent="-171450">
@@ -10228,7 +10181,7 @@
                 </a:tc>
                 <a:extLst>
                   <a:ext uri="{0D108BD9-81ED-4DB2-BD59-A6C34878D82A}">
-                    <a16:rowId xmlns:a16="http://schemas.microsoft.com/office/drawing/2014/main" xmlns="" val="968029505"/>
+                    <a16:rowId xmlns="" xmlns:a16="http://schemas.microsoft.com/office/drawing/2014/main" val="968029505"/>
                   </a:ext>
                 </a:extLst>
               </a:tr>
@@ -10534,7 +10487,7 @@
                 </a:tc>
                 <a:extLst>
                   <a:ext uri="{0D108BD9-81ED-4DB2-BD59-A6C34878D82A}">
-                    <a16:rowId xmlns:a16="http://schemas.microsoft.com/office/drawing/2014/main" xmlns="" val="2143253950"/>
+                    <a16:rowId xmlns="" xmlns:a16="http://schemas.microsoft.com/office/drawing/2014/main" val="2143253950"/>
                   </a:ext>
                 </a:extLst>
               </a:tr>
@@ -10585,27 +10538,8 @@
                           <a:ea typeface="+mn-ea"/>
                           <a:cs typeface="+mn-cs"/>
                         </a:rPr>
-                        <a:t>Diversity supplement </a:t>
+                        <a:t>Diversity supplement director</a:t>
                       </a:r>
-                      <a:r>
-                        <a:rPr lang="en-US" sz="1000" kern="1200" dirty="0" smtClean="0">
-                          <a:solidFill>
-                            <a:schemeClr val="dk1"/>
-                          </a:solidFill>
-                          <a:latin typeface="+mn-lt"/>
-                          <a:ea typeface="+mn-ea"/>
-                          <a:cs typeface="+mn-cs"/>
-                        </a:rPr>
-                        <a:t>director</a:t>
-                      </a:r>
-                      <a:endParaRPr lang="en-US" sz="1000" kern="1200" dirty="0" smtClean="0">
-                        <a:solidFill>
-                          <a:schemeClr val="dk1"/>
-                        </a:solidFill>
-                        <a:latin typeface="+mn-lt"/>
-                        <a:ea typeface="+mn-ea"/>
-                        <a:cs typeface="+mn-cs"/>
-                      </a:endParaRPr>
                     </a:p>
                     <a:p>
                       <a:pPr marL="171450" indent="-171450">
@@ -10614,11 +10548,7 @@
                       </a:pPr>
                       <a:r>
                         <a:rPr lang="en-US" sz="1000" dirty="0" smtClean="0"/>
-                        <a:t>Guest </a:t>
-                      </a:r>
-                      <a:r>
-                        <a:rPr lang="en-US" sz="1000" dirty="0" smtClean="0"/>
-                        <a:t>user</a:t>
+                        <a:t>Guest user</a:t>
                       </a:r>
                     </a:p>
                     <a:p>
@@ -10656,18 +10586,7 @@
                           <a:ea typeface="+mn-ea"/>
                           <a:cs typeface="+mn-cs"/>
                         </a:rPr>
-                        <a:t>Possible </a:t>
-                      </a:r>
-                      <a:r>
-                        <a:rPr lang="en-US" sz="1000" kern="1200" dirty="0" smtClean="0">
-                          <a:solidFill>
-                            <a:schemeClr val="dk1"/>
-                          </a:solidFill>
-                          <a:latin typeface="+mn-lt"/>
-                          <a:ea typeface="+mn-ea"/>
-                          <a:cs typeface="+mn-cs"/>
-                        </a:rPr>
-                        <a:t>changes to roles related to promotion/rejection of draft templates</a:t>
+                        <a:t>Possible changes to roles related to promotion/rejection of draft templates</a:t>
                       </a:r>
                       <a:endParaRPr lang="en-US" sz="1000" kern="1200" dirty="0">
                         <a:solidFill>
@@ -10683,7 +10602,7 @@
                 </a:tc>
                 <a:extLst>
                   <a:ext uri="{0D108BD9-81ED-4DB2-BD59-A6C34878D82A}">
-                    <a16:rowId xmlns:a16="http://schemas.microsoft.com/office/drawing/2014/main" xmlns="" val="2630334932"/>
+                    <a16:rowId xmlns="" xmlns:a16="http://schemas.microsoft.com/office/drawing/2014/main" val="2630334932"/>
                   </a:ext>
                 </a:extLst>
               </a:tr>
@@ -10832,7 +10751,7 @@
                 </a:tc>
                 <a:extLst>
                   <a:ext uri="{0D108BD9-81ED-4DB2-BD59-A6C34878D82A}">
-                    <a16:rowId xmlns:a16="http://schemas.microsoft.com/office/drawing/2014/main" xmlns="" val="1668435441"/>
+                    <a16:rowId xmlns="" xmlns:a16="http://schemas.microsoft.com/office/drawing/2014/main" val="1668435441"/>
                   </a:ext>
                 </a:extLst>
               </a:tr>

</xml_diff>